<commit_message>
Mejorada presentación del día 2
</commit_message>
<xml_diff>
--- a/contenido_curso/Programación Web - Día 2.pptx
+++ b/contenido_curso/Programación Web - Día 2.pptx
@@ -5,7 +5,7 @@
     <p:sldMasterId id="2147483648" r:id="rId1"/>
   </p:sldMasterIdLst>
   <p:notesMasterIdLst>
-    <p:notesMasterId r:id="rId12"/>
+    <p:notesMasterId r:id="rId17"/>
   </p:notesMasterIdLst>
   <p:sldIdLst>
     <p:sldId id="259" r:id="rId2"/>
@@ -18,6 +18,11 @@
     <p:sldId id="292" r:id="rId9"/>
     <p:sldId id="293" r:id="rId10"/>
     <p:sldId id="294" r:id="rId11"/>
+    <p:sldId id="295" r:id="rId12"/>
+    <p:sldId id="296" r:id="rId13"/>
+    <p:sldId id="297" r:id="rId14"/>
+    <p:sldId id="298" r:id="rId15"/>
+    <p:sldId id="299" r:id="rId16"/>
   </p:sldIdLst>
   <p:sldSz cx="9144000" cy="6858000" type="screen4x3"/>
   <p:notesSz cx="6858000" cy="9144000"/>
@@ -201,7 +206,7 @@
           <a:p>
             <a:fld id="{831EFE70-F5D3-49F6-8C2B-91E6FE538D8A}" type="datetimeFigureOut">
               <a:rPr lang="es-VE" smtClean="0"/>
-              <a:t>28/2/2023</a:t>
+              <a:t>20/4/2023</a:t>
             </a:fld>
             <a:endParaRPr lang="es-VE"/>
           </a:p>
@@ -650,7 +655,7 @@
           <a:p>
             <a:fld id="{823E8A56-526A-4CC4-96EA-C5813A8209A1}" type="datetimeFigureOut">
               <a:rPr lang="es-VE" smtClean="0"/>
-              <a:t>28/2/2023</a:t>
+              <a:t>20/4/2023</a:t>
             </a:fld>
             <a:endParaRPr lang="es-VE"/>
           </a:p>
@@ -820,7 +825,7 @@
           <a:p>
             <a:fld id="{823E8A56-526A-4CC4-96EA-C5813A8209A1}" type="datetimeFigureOut">
               <a:rPr lang="es-VE" smtClean="0"/>
-              <a:t>28/2/2023</a:t>
+              <a:t>20/4/2023</a:t>
             </a:fld>
             <a:endParaRPr lang="es-VE"/>
           </a:p>
@@ -1000,7 +1005,7 @@
           <a:p>
             <a:fld id="{823E8A56-526A-4CC4-96EA-C5813A8209A1}" type="datetimeFigureOut">
               <a:rPr lang="es-VE" smtClean="0"/>
-              <a:t>28/2/2023</a:t>
+              <a:t>20/4/2023</a:t>
             </a:fld>
             <a:endParaRPr lang="es-VE"/>
           </a:p>
@@ -1170,7 +1175,7 @@
           <a:p>
             <a:fld id="{823E8A56-526A-4CC4-96EA-C5813A8209A1}" type="datetimeFigureOut">
               <a:rPr lang="es-VE" smtClean="0"/>
-              <a:t>28/2/2023</a:t>
+              <a:t>20/4/2023</a:t>
             </a:fld>
             <a:endParaRPr lang="es-VE"/>
           </a:p>
@@ -1416,7 +1421,7 @@
           <a:p>
             <a:fld id="{823E8A56-526A-4CC4-96EA-C5813A8209A1}" type="datetimeFigureOut">
               <a:rPr lang="es-VE" smtClean="0"/>
-              <a:t>28/2/2023</a:t>
+              <a:t>20/4/2023</a:t>
             </a:fld>
             <a:endParaRPr lang="es-VE"/>
           </a:p>
@@ -1704,7 +1709,7 @@
           <a:p>
             <a:fld id="{823E8A56-526A-4CC4-96EA-C5813A8209A1}" type="datetimeFigureOut">
               <a:rPr lang="es-VE" smtClean="0"/>
-              <a:t>28/2/2023</a:t>
+              <a:t>20/4/2023</a:t>
             </a:fld>
             <a:endParaRPr lang="es-VE"/>
           </a:p>
@@ -2126,7 +2131,7 @@
           <a:p>
             <a:fld id="{823E8A56-526A-4CC4-96EA-C5813A8209A1}" type="datetimeFigureOut">
               <a:rPr lang="es-VE" smtClean="0"/>
-              <a:t>28/2/2023</a:t>
+              <a:t>20/4/2023</a:t>
             </a:fld>
             <a:endParaRPr lang="es-VE"/>
           </a:p>
@@ -2244,7 +2249,7 @@
           <a:p>
             <a:fld id="{823E8A56-526A-4CC4-96EA-C5813A8209A1}" type="datetimeFigureOut">
               <a:rPr lang="es-VE" smtClean="0"/>
-              <a:t>28/2/2023</a:t>
+              <a:t>20/4/2023</a:t>
             </a:fld>
             <a:endParaRPr lang="es-VE"/>
           </a:p>
@@ -2339,7 +2344,7 @@
           <a:p>
             <a:fld id="{823E8A56-526A-4CC4-96EA-C5813A8209A1}" type="datetimeFigureOut">
               <a:rPr lang="es-VE" smtClean="0"/>
-              <a:t>28/2/2023</a:t>
+              <a:t>20/4/2023</a:t>
             </a:fld>
             <a:endParaRPr lang="es-VE"/>
           </a:p>
@@ -2616,7 +2621,7 @@
           <a:p>
             <a:fld id="{823E8A56-526A-4CC4-96EA-C5813A8209A1}" type="datetimeFigureOut">
               <a:rPr lang="es-VE" smtClean="0"/>
-              <a:t>28/2/2023</a:t>
+              <a:t>20/4/2023</a:t>
             </a:fld>
             <a:endParaRPr lang="es-VE"/>
           </a:p>
@@ -2869,7 +2874,7 @@
           <a:p>
             <a:fld id="{823E8A56-526A-4CC4-96EA-C5813A8209A1}" type="datetimeFigureOut">
               <a:rPr lang="es-VE" smtClean="0"/>
-              <a:t>28/2/2023</a:t>
+              <a:t>20/4/2023</a:t>
             </a:fld>
             <a:endParaRPr lang="es-VE"/>
           </a:p>
@@ -3082,7 +3087,7 @@
           <a:p>
             <a:fld id="{823E8A56-526A-4CC4-96EA-C5813A8209A1}" type="datetimeFigureOut">
               <a:rPr lang="es-VE" smtClean="0"/>
-              <a:t>28/2/2023</a:t>
+              <a:t>20/4/2023</a:t>
             </a:fld>
             <a:endParaRPr lang="es-VE"/>
           </a:p>
@@ -3652,8 +3657,8 @@
         </p:nvSpPr>
         <p:spPr>
           <a:xfrm>
-            <a:off x="395536" y="404664"/>
-            <a:ext cx="7996100" cy="523220"/>
+            <a:off x="2048395" y="666274"/>
+            <a:ext cx="5253361" cy="523220"/>
           </a:xfrm>
           <a:prstGeom prst="rect">
             <a:avLst/>
@@ -3673,7 +3678,7 @@
                 </a:solidFill>
                 <a:latin typeface="Ubuntu" panose="020B0504030602030204" pitchFamily="34" charset="0"/>
               </a:rPr>
-              <a:t>Sistema de control de Versiones Centralizado</a:t>
+              <a:t>Estándares para ramas en GIT</a:t>
             </a:r>
             <a:endParaRPr lang="es-VE" sz="2800" b="1" dirty="0">
               <a:solidFill>
@@ -3729,6 +3734,1098 @@
     <p:extLst>
       <p:ext uri="{BB962C8B-B14F-4D97-AF65-F5344CB8AC3E}">
         <p14:creationId xmlns:p14="http://schemas.microsoft.com/office/powerpoint/2010/main" val="651421470"/>
+      </p:ext>
+    </p:extLst>
+  </p:cSld>
+  <p:clrMapOvr>
+    <a:masterClrMapping/>
+  </p:clrMapOvr>
+  <p:timing>
+    <p:tnLst>
+      <p:par>
+        <p:cTn id="1" dur="indefinite" restart="never" nodeType="tmRoot"/>
+      </p:par>
+    </p:tnLst>
+  </p:timing>
+</p:sld>
+</file>
+
+<file path=ppt/slides/slide11.xml><?xml version="1.0" encoding="utf-8"?>
+<p:sld xmlns:a="http://schemas.openxmlformats.org/drawingml/2006/main" xmlns:r="http://schemas.openxmlformats.org/officeDocument/2006/relationships" xmlns:p="http://schemas.openxmlformats.org/presentationml/2006/main">
+  <p:cSld>
+    <p:bg>
+      <p:bgPr>
+        <a:gradFill>
+          <a:gsLst>
+            <a:gs pos="0">
+              <a:srgbClr val="990033">
+                <a:lumMod val="81000"/>
+              </a:srgbClr>
+            </a:gs>
+            <a:gs pos="84000">
+              <a:schemeClr val="accent4">
+                <a:lumMod val="25000"/>
+              </a:schemeClr>
+            </a:gs>
+          </a:gsLst>
+          <a:lin ang="19200000" scaled="0"/>
+        </a:gradFill>
+        <a:effectLst/>
+      </p:bgPr>
+    </p:bg>
+    <p:spTree>
+      <p:nvGrpSpPr>
+        <p:cNvPr id="1" name=""/>
+        <p:cNvGrpSpPr/>
+        <p:nvPr/>
+      </p:nvGrpSpPr>
+      <p:grpSpPr>
+        <a:xfrm>
+          <a:off x="0" y="0"/>
+          <a:ext cx="0" cy="0"/>
+          <a:chOff x="0" y="0"/>
+          <a:chExt cx="0" cy="0"/>
+        </a:xfrm>
+      </p:grpSpPr>
+      <p:sp>
+        <p:nvSpPr>
+          <p:cNvPr id="2" name="1 CuadroTexto"/>
+          <p:cNvSpPr txBox="1"/>
+          <p:nvPr/>
+        </p:nvSpPr>
+        <p:spPr>
+          <a:xfrm>
+            <a:off x="1292310" y="2028617"/>
+            <a:ext cx="6559381" cy="2800767"/>
+          </a:xfrm>
+          <a:prstGeom prst="rect">
+            <a:avLst/>
+          </a:prstGeom>
+          <a:noFill/>
+        </p:spPr>
+        <p:txBody>
+          <a:bodyPr wrap="square" rtlCol="0">
+            <a:spAutoFit/>
+          </a:bodyPr>
+          <a:lstStyle/>
+          <a:p>
+            <a:pPr algn="ctr"/>
+            <a:r>
+              <a:rPr lang="es-MX" sz="8800" dirty="0" smtClean="0">
+                <a:solidFill>
+                  <a:schemeClr val="bg1"/>
+                </a:solidFill>
+                <a:latin typeface="Futurama" pitchFamily="2" charset="0"/>
+              </a:rPr>
+              <a:t>Repositorios</a:t>
+            </a:r>
+          </a:p>
+          <a:p>
+            <a:pPr algn="ctr"/>
+            <a:r>
+              <a:rPr lang="es-MX" sz="8800" dirty="0" err="1" smtClean="0">
+                <a:solidFill>
+                  <a:schemeClr val="bg1"/>
+                </a:solidFill>
+                <a:latin typeface="Futurama" pitchFamily="2" charset="0"/>
+              </a:rPr>
+              <a:t>GitHub</a:t>
+            </a:r>
+            <a:endParaRPr lang="es-VE" sz="8800" dirty="0">
+              <a:solidFill>
+                <a:schemeClr val="bg1"/>
+              </a:solidFill>
+              <a:latin typeface="Futurama" pitchFamily="2" charset="0"/>
+            </a:endParaRPr>
+          </a:p>
+        </p:txBody>
+      </p:sp>
+    </p:spTree>
+    <p:extLst>
+      <p:ext uri="{BB962C8B-B14F-4D97-AF65-F5344CB8AC3E}">
+        <p14:creationId xmlns:p14="http://schemas.microsoft.com/office/powerpoint/2010/main" val="1435904573"/>
+      </p:ext>
+    </p:extLst>
+  </p:cSld>
+  <p:clrMapOvr>
+    <a:masterClrMapping/>
+  </p:clrMapOvr>
+  <p:timing>
+    <p:tnLst>
+      <p:par>
+        <p:cTn id="1" dur="indefinite" restart="never" nodeType="tmRoot"/>
+      </p:par>
+    </p:tnLst>
+  </p:timing>
+</p:sld>
+</file>
+
+<file path=ppt/slides/slide12.xml><?xml version="1.0" encoding="utf-8"?>
+<p:sld xmlns:a="http://schemas.openxmlformats.org/drawingml/2006/main" xmlns:r="http://schemas.openxmlformats.org/officeDocument/2006/relationships" xmlns:p="http://schemas.openxmlformats.org/presentationml/2006/main">
+  <p:cSld>
+    <p:bg>
+      <p:bgPr>
+        <a:gradFill>
+          <a:gsLst>
+            <a:gs pos="0">
+              <a:srgbClr val="990033">
+                <a:lumMod val="81000"/>
+              </a:srgbClr>
+            </a:gs>
+            <a:gs pos="84000">
+              <a:schemeClr val="accent4">
+                <a:lumMod val="25000"/>
+              </a:schemeClr>
+            </a:gs>
+          </a:gsLst>
+          <a:lin ang="19200000" scaled="0"/>
+        </a:gradFill>
+        <a:effectLst/>
+      </p:bgPr>
+    </p:bg>
+    <p:spTree>
+      <p:nvGrpSpPr>
+        <p:cNvPr id="1" name=""/>
+        <p:cNvGrpSpPr/>
+        <p:nvPr/>
+      </p:nvGrpSpPr>
+      <p:grpSpPr>
+        <a:xfrm>
+          <a:off x="0" y="0"/>
+          <a:ext cx="0" cy="0"/>
+          <a:chOff x="0" y="0"/>
+          <a:chExt cx="0" cy="0"/>
+        </a:xfrm>
+      </p:grpSpPr>
+      <p:sp>
+        <p:nvSpPr>
+          <p:cNvPr id="2" name="1 CuadroTexto"/>
+          <p:cNvSpPr txBox="1"/>
+          <p:nvPr/>
+        </p:nvSpPr>
+        <p:spPr>
+          <a:xfrm>
+            <a:off x="539552" y="565229"/>
+            <a:ext cx="3384376" cy="830997"/>
+          </a:xfrm>
+          <a:prstGeom prst="rect">
+            <a:avLst/>
+          </a:prstGeom>
+          <a:noFill/>
+        </p:spPr>
+        <p:txBody>
+          <a:bodyPr wrap="square" rtlCol="0">
+            <a:spAutoFit/>
+          </a:bodyPr>
+          <a:lstStyle/>
+          <a:p>
+            <a:pPr algn="ctr"/>
+            <a:r>
+              <a:rPr lang="es-MX" sz="4800" dirty="0" smtClean="0">
+                <a:solidFill>
+                  <a:schemeClr val="bg1"/>
+                </a:solidFill>
+                <a:latin typeface="Futurama" pitchFamily="2" charset="0"/>
+              </a:rPr>
+              <a:t>Linux</a:t>
+            </a:r>
+            <a:endParaRPr lang="es-VE" sz="4800" dirty="0">
+              <a:solidFill>
+                <a:schemeClr val="bg1"/>
+              </a:solidFill>
+              <a:latin typeface="Futurama" pitchFamily="2" charset="0"/>
+            </a:endParaRPr>
+          </a:p>
+        </p:txBody>
+      </p:sp>
+      <p:pic>
+        <p:nvPicPr>
+          <p:cNvPr id="1026" name="Picture 2" descr="C:\Users\Leonardo\Downloads\pngwing.com (1).png"/>
+          <p:cNvPicPr>
+            <a:picLocks noChangeAspect="1" noChangeArrowheads="1"/>
+          </p:cNvPicPr>
+          <p:nvPr/>
+        </p:nvPicPr>
+        <p:blipFill>
+          <a:blip r:embed="rId2" cstate="print">
+            <a:extLst>
+              <a:ext uri="{28A0092B-C50C-407E-A947-70E740481C1C}">
+                <a14:useLocalDpi xmlns:a14="http://schemas.microsoft.com/office/drawing/2010/main" val="0"/>
+              </a:ext>
+            </a:extLst>
+          </a:blip>
+          <a:srcRect/>
+          <a:stretch>
+            <a:fillRect/>
+          </a:stretch>
+        </p:blipFill>
+        <p:spPr bwMode="auto">
+          <a:xfrm>
+            <a:off x="3131840" y="1694965"/>
+            <a:ext cx="2191826" cy="1104881"/>
+          </a:xfrm>
+          <a:prstGeom prst="rect">
+            <a:avLst/>
+          </a:prstGeom>
+          <a:noFill/>
+          <a:extLst>
+            <a:ext uri="{909E8E84-426E-40DD-AFC4-6F175D3DCCD1}">
+              <a14:hiddenFill xmlns:a14="http://schemas.microsoft.com/office/drawing/2010/main">
+                <a:solidFill>
+                  <a:srgbClr val="FFFFFF"/>
+                </a:solidFill>
+              </a14:hiddenFill>
+            </a:ext>
+          </a:extLst>
+        </p:spPr>
+      </p:pic>
+      <p:pic>
+        <p:nvPicPr>
+          <p:cNvPr id="1027" name="Picture 3" descr="C:\Users\Leonardo\Downloads\pngwing.com.png"/>
+          <p:cNvPicPr>
+            <a:picLocks noChangeAspect="1" noChangeArrowheads="1"/>
+          </p:cNvPicPr>
+          <p:nvPr/>
+        </p:nvPicPr>
+        <p:blipFill>
+          <a:blip r:embed="rId3" cstate="print">
+            <a:extLst>
+              <a:ext uri="{28A0092B-C50C-407E-A947-70E740481C1C}">
+                <a14:useLocalDpi xmlns:a14="http://schemas.microsoft.com/office/drawing/2010/main" val="0"/>
+              </a:ext>
+            </a:extLst>
+          </a:blip>
+          <a:srcRect/>
+          <a:stretch>
+            <a:fillRect/>
+          </a:stretch>
+        </p:blipFill>
+        <p:spPr bwMode="auto">
+          <a:xfrm>
+            <a:off x="5868144" y="360384"/>
+            <a:ext cx="2217981" cy="2572859"/>
+          </a:xfrm>
+          <a:prstGeom prst="rect">
+            <a:avLst/>
+          </a:prstGeom>
+          <a:noFill/>
+          <a:extLst>
+            <a:ext uri="{909E8E84-426E-40DD-AFC4-6F175D3DCCD1}">
+              <a14:hiddenFill xmlns:a14="http://schemas.microsoft.com/office/drawing/2010/main">
+                <a:solidFill>
+                  <a:srgbClr val="FFFFFF"/>
+                </a:solidFill>
+              </a14:hiddenFill>
+            </a:ext>
+          </a:extLst>
+        </p:spPr>
+      </p:pic>
+      <p:pic>
+        <p:nvPicPr>
+          <p:cNvPr id="1028" name="Picture 4" descr="C:\Users\Leonardo\Downloads\pngwing.com (2).png"/>
+          <p:cNvPicPr>
+            <a:picLocks noChangeAspect="1" noChangeArrowheads="1"/>
+          </p:cNvPicPr>
+          <p:nvPr/>
+        </p:nvPicPr>
+        <p:blipFill>
+          <a:blip r:embed="rId4" cstate="print">
+            <a:extLst>
+              <a:ext uri="{28A0092B-C50C-407E-A947-70E740481C1C}">
+                <a14:useLocalDpi xmlns:a14="http://schemas.microsoft.com/office/drawing/2010/main" val="0"/>
+              </a:ext>
+            </a:extLst>
+          </a:blip>
+          <a:srcRect/>
+          <a:stretch>
+            <a:fillRect/>
+          </a:stretch>
+        </p:blipFill>
+        <p:spPr bwMode="auto">
+          <a:xfrm>
+            <a:off x="1239782" y="1628800"/>
+            <a:ext cx="1412737" cy="1171046"/>
+          </a:xfrm>
+          <a:prstGeom prst="rect">
+            <a:avLst/>
+          </a:prstGeom>
+          <a:noFill/>
+          <a:extLst>
+            <a:ext uri="{909E8E84-426E-40DD-AFC4-6F175D3DCCD1}">
+              <a14:hiddenFill xmlns:a14="http://schemas.microsoft.com/office/drawing/2010/main">
+                <a:solidFill>
+                  <a:srgbClr val="FFFFFF"/>
+                </a:solidFill>
+              </a14:hiddenFill>
+            </a:ext>
+          </a:extLst>
+        </p:spPr>
+      </p:pic>
+      <p:pic>
+        <p:nvPicPr>
+          <p:cNvPr id="1029" name="Picture 5"/>
+          <p:cNvPicPr>
+            <a:picLocks noChangeAspect="1" noChangeArrowheads="1"/>
+          </p:cNvPicPr>
+          <p:nvPr/>
+        </p:nvPicPr>
+        <p:blipFill>
+          <a:blip r:embed="rId5">
+            <a:extLst>
+              <a:ext uri="{28A0092B-C50C-407E-A947-70E740481C1C}">
+                <a14:useLocalDpi xmlns:a14="http://schemas.microsoft.com/office/drawing/2010/main" val="0"/>
+              </a:ext>
+            </a:extLst>
+          </a:blip>
+          <a:srcRect/>
+          <a:stretch>
+            <a:fillRect/>
+          </a:stretch>
+        </p:blipFill>
+        <p:spPr bwMode="auto">
+          <a:xfrm>
+            <a:off x="755576" y="3221293"/>
+            <a:ext cx="7762597" cy="3157197"/>
+          </a:xfrm>
+          <a:prstGeom prst="rect">
+            <a:avLst/>
+          </a:prstGeom>
+          <a:noFill/>
+          <a:ln>
+            <a:noFill/>
+          </a:ln>
+          <a:extLst>
+            <a:ext uri="{909E8E84-426E-40DD-AFC4-6F175D3DCCD1}">
+              <a14:hiddenFill xmlns:a14="http://schemas.microsoft.com/office/drawing/2010/main">
+                <a:solidFill>
+                  <a:schemeClr val="accent1"/>
+                </a:solidFill>
+              </a14:hiddenFill>
+            </a:ext>
+            <a:ext uri="{91240B29-F687-4F45-9708-019B960494DF}">
+              <a14:hiddenLine xmlns:a14="http://schemas.microsoft.com/office/drawing/2010/main" w="9525">
+                <a:solidFill>
+                  <a:schemeClr val="tx1"/>
+                </a:solidFill>
+                <a:miter lim="800000"/>
+                <a:headEnd/>
+                <a:tailEnd/>
+              </a14:hiddenLine>
+            </a:ext>
+          </a:extLst>
+        </p:spPr>
+      </p:pic>
+    </p:spTree>
+    <p:extLst>
+      <p:ext uri="{BB962C8B-B14F-4D97-AF65-F5344CB8AC3E}">
+        <p14:creationId xmlns:p14="http://schemas.microsoft.com/office/powerpoint/2010/main" val="2565813537"/>
+      </p:ext>
+    </p:extLst>
+  </p:cSld>
+  <p:clrMapOvr>
+    <a:masterClrMapping/>
+  </p:clrMapOvr>
+  <p:timing>
+    <p:tnLst>
+      <p:par>
+        <p:cTn id="1" dur="indefinite" restart="never" nodeType="tmRoot"/>
+      </p:par>
+    </p:tnLst>
+  </p:timing>
+</p:sld>
+</file>
+
+<file path=ppt/slides/slide13.xml><?xml version="1.0" encoding="utf-8"?>
+<p:sld xmlns:a="http://schemas.openxmlformats.org/drawingml/2006/main" xmlns:r="http://schemas.openxmlformats.org/officeDocument/2006/relationships" xmlns:p="http://schemas.openxmlformats.org/presentationml/2006/main">
+  <p:cSld>
+    <p:bg>
+      <p:bgPr>
+        <a:gradFill>
+          <a:gsLst>
+            <a:gs pos="0">
+              <a:srgbClr val="990033">
+                <a:lumMod val="81000"/>
+              </a:srgbClr>
+            </a:gs>
+            <a:gs pos="84000">
+              <a:schemeClr val="accent4">
+                <a:lumMod val="25000"/>
+              </a:schemeClr>
+            </a:gs>
+          </a:gsLst>
+          <a:lin ang="19200000" scaled="0"/>
+        </a:gradFill>
+        <a:effectLst/>
+      </p:bgPr>
+    </p:bg>
+    <p:spTree>
+      <p:nvGrpSpPr>
+        <p:cNvPr id="1" name=""/>
+        <p:cNvGrpSpPr/>
+        <p:nvPr/>
+      </p:nvGrpSpPr>
+      <p:grpSpPr>
+        <a:xfrm>
+          <a:off x="0" y="0"/>
+          <a:ext cx="0" cy="0"/>
+          <a:chOff x="0" y="0"/>
+          <a:chExt cx="0" cy="0"/>
+        </a:xfrm>
+      </p:grpSpPr>
+      <p:sp>
+        <p:nvSpPr>
+          <p:cNvPr id="2" name="1 CuadroTexto"/>
+          <p:cNvSpPr txBox="1"/>
+          <p:nvPr/>
+        </p:nvSpPr>
+        <p:spPr>
+          <a:xfrm>
+            <a:off x="539552" y="565229"/>
+            <a:ext cx="3384376" cy="830997"/>
+          </a:xfrm>
+          <a:prstGeom prst="rect">
+            <a:avLst/>
+          </a:prstGeom>
+          <a:noFill/>
+        </p:spPr>
+        <p:txBody>
+          <a:bodyPr wrap="square" rtlCol="0">
+            <a:spAutoFit/>
+          </a:bodyPr>
+          <a:lstStyle/>
+          <a:p>
+            <a:pPr algn="ctr"/>
+            <a:r>
+              <a:rPr lang="es-MX" sz="4800" dirty="0" smtClean="0">
+                <a:solidFill>
+                  <a:schemeClr val="bg1"/>
+                </a:solidFill>
+                <a:latin typeface="Futurama" pitchFamily="2" charset="0"/>
+              </a:rPr>
+              <a:t>Meta</a:t>
+            </a:r>
+            <a:endParaRPr lang="es-VE" sz="4800" dirty="0">
+              <a:solidFill>
+                <a:schemeClr val="bg1"/>
+              </a:solidFill>
+              <a:latin typeface="Futurama" pitchFamily="2" charset="0"/>
+            </a:endParaRPr>
+          </a:p>
+        </p:txBody>
+      </p:sp>
+      <p:pic>
+        <p:nvPicPr>
+          <p:cNvPr id="2050" name="Picture 2" descr="C:\Users\Leonardo\Downloads\pngwing.com (3).png"/>
+          <p:cNvPicPr>
+            <a:picLocks noChangeAspect="1" noChangeArrowheads="1"/>
+          </p:cNvPicPr>
+          <p:nvPr/>
+        </p:nvPicPr>
+        <p:blipFill>
+          <a:blip r:embed="rId2" cstate="print">
+            <a:extLst>
+              <a:ext uri="{28A0092B-C50C-407E-A947-70E740481C1C}">
+                <a14:useLocalDpi xmlns:a14="http://schemas.microsoft.com/office/drawing/2010/main" val="0"/>
+              </a:ext>
+            </a:extLst>
+          </a:blip>
+          <a:srcRect/>
+          <a:stretch>
+            <a:fillRect/>
+          </a:stretch>
+        </p:blipFill>
+        <p:spPr bwMode="auto">
+          <a:xfrm>
+            <a:off x="3707904" y="-51232"/>
+            <a:ext cx="5052168" cy="2841844"/>
+          </a:xfrm>
+          <a:prstGeom prst="rect">
+            <a:avLst/>
+          </a:prstGeom>
+          <a:noFill/>
+          <a:extLst>
+            <a:ext uri="{909E8E84-426E-40DD-AFC4-6F175D3DCCD1}">
+              <a14:hiddenFill xmlns:a14="http://schemas.microsoft.com/office/drawing/2010/main">
+                <a:solidFill>
+                  <a:srgbClr val="FFFFFF"/>
+                </a:solidFill>
+              </a14:hiddenFill>
+            </a:ext>
+          </a:extLst>
+        </p:spPr>
+      </p:pic>
+      <p:pic>
+        <p:nvPicPr>
+          <p:cNvPr id="2051" name="Picture 3" descr="C:\Users\Leonardo\Downloads\pngwing.com (5).png"/>
+          <p:cNvPicPr>
+            <a:picLocks noChangeAspect="1" noChangeArrowheads="1"/>
+          </p:cNvPicPr>
+          <p:nvPr/>
+        </p:nvPicPr>
+        <p:blipFill>
+          <a:blip r:embed="rId3" cstate="print">
+            <a:extLst>
+              <a:ext uri="{28A0092B-C50C-407E-A947-70E740481C1C}">
+                <a14:useLocalDpi xmlns:a14="http://schemas.microsoft.com/office/drawing/2010/main" val="0"/>
+              </a:ext>
+            </a:extLst>
+          </a:blip>
+          <a:srcRect/>
+          <a:stretch>
+            <a:fillRect/>
+          </a:stretch>
+        </p:blipFill>
+        <p:spPr bwMode="auto">
+          <a:xfrm>
+            <a:off x="1588414" y="1592796"/>
+            <a:ext cx="936811" cy="936811"/>
+          </a:xfrm>
+          <a:prstGeom prst="rect">
+            <a:avLst/>
+          </a:prstGeom>
+          <a:noFill/>
+          <a:extLst>
+            <a:ext uri="{909E8E84-426E-40DD-AFC4-6F175D3DCCD1}">
+              <a14:hiddenFill xmlns:a14="http://schemas.microsoft.com/office/drawing/2010/main">
+                <a:solidFill>
+                  <a:srgbClr val="FFFFFF"/>
+                </a:solidFill>
+              </a14:hiddenFill>
+            </a:ext>
+          </a:extLst>
+        </p:spPr>
+      </p:pic>
+      <p:pic>
+        <p:nvPicPr>
+          <p:cNvPr id="2052" name="Picture 4" descr="C:\Users\Leonardo\Downloads\pngwing.com (4).png"/>
+          <p:cNvPicPr>
+            <a:picLocks noChangeAspect="1" noChangeArrowheads="1"/>
+          </p:cNvPicPr>
+          <p:nvPr/>
+        </p:nvPicPr>
+        <p:blipFill>
+          <a:blip r:embed="rId4" cstate="print">
+            <a:extLst>
+              <a:ext uri="{28A0092B-C50C-407E-A947-70E740481C1C}">
+                <a14:useLocalDpi xmlns:a14="http://schemas.microsoft.com/office/drawing/2010/main" val="0"/>
+              </a:ext>
+            </a:extLst>
+          </a:blip>
+          <a:srcRect/>
+          <a:stretch>
+            <a:fillRect/>
+          </a:stretch>
+        </p:blipFill>
+        <p:spPr bwMode="auto">
+          <a:xfrm>
+            <a:off x="2987117" y="1592796"/>
+            <a:ext cx="936811" cy="936811"/>
+          </a:xfrm>
+          <a:prstGeom prst="rect">
+            <a:avLst/>
+          </a:prstGeom>
+          <a:noFill/>
+          <a:extLst>
+            <a:ext uri="{909E8E84-426E-40DD-AFC4-6F175D3DCCD1}">
+              <a14:hiddenFill xmlns:a14="http://schemas.microsoft.com/office/drawing/2010/main">
+                <a:solidFill>
+                  <a:srgbClr val="FFFFFF"/>
+                </a:solidFill>
+              </a14:hiddenFill>
+            </a:ext>
+          </a:extLst>
+        </p:spPr>
+      </p:pic>
+      <p:pic>
+        <p:nvPicPr>
+          <p:cNvPr id="2053" name="Picture 5"/>
+          <p:cNvPicPr>
+            <a:picLocks noChangeAspect="1" noChangeArrowheads="1"/>
+          </p:cNvPicPr>
+          <p:nvPr/>
+        </p:nvPicPr>
+        <p:blipFill>
+          <a:blip r:embed="rId5">
+            <a:extLst>
+              <a:ext uri="{28A0092B-C50C-407E-A947-70E740481C1C}">
+                <a14:useLocalDpi xmlns:a14="http://schemas.microsoft.com/office/drawing/2010/main" val="0"/>
+              </a:ext>
+            </a:extLst>
+          </a:blip>
+          <a:srcRect/>
+          <a:stretch>
+            <a:fillRect/>
+          </a:stretch>
+        </p:blipFill>
+        <p:spPr bwMode="auto">
+          <a:xfrm>
+            <a:off x="539552" y="2816932"/>
+            <a:ext cx="8031196" cy="3830350"/>
+          </a:xfrm>
+          <a:prstGeom prst="rect">
+            <a:avLst/>
+          </a:prstGeom>
+          <a:noFill/>
+          <a:ln>
+            <a:noFill/>
+          </a:ln>
+          <a:extLst>
+            <a:ext uri="{909E8E84-426E-40DD-AFC4-6F175D3DCCD1}">
+              <a14:hiddenFill xmlns:a14="http://schemas.microsoft.com/office/drawing/2010/main">
+                <a:solidFill>
+                  <a:schemeClr val="accent1"/>
+                </a:solidFill>
+              </a14:hiddenFill>
+            </a:ext>
+            <a:ext uri="{91240B29-F687-4F45-9708-019B960494DF}">
+              <a14:hiddenLine xmlns:a14="http://schemas.microsoft.com/office/drawing/2010/main" w="9525">
+                <a:solidFill>
+                  <a:schemeClr val="tx1"/>
+                </a:solidFill>
+                <a:miter lim="800000"/>
+                <a:headEnd/>
+                <a:tailEnd/>
+              </a14:hiddenLine>
+            </a:ext>
+          </a:extLst>
+        </p:spPr>
+      </p:pic>
+    </p:spTree>
+    <p:extLst>
+      <p:ext uri="{BB962C8B-B14F-4D97-AF65-F5344CB8AC3E}">
+        <p14:creationId xmlns:p14="http://schemas.microsoft.com/office/powerpoint/2010/main" val="811222875"/>
+      </p:ext>
+    </p:extLst>
+  </p:cSld>
+  <p:clrMapOvr>
+    <a:masterClrMapping/>
+  </p:clrMapOvr>
+  <p:timing>
+    <p:tnLst>
+      <p:par>
+        <p:cTn id="1" dur="indefinite" restart="never" nodeType="tmRoot"/>
+      </p:par>
+    </p:tnLst>
+  </p:timing>
+</p:sld>
+</file>
+
+<file path=ppt/slides/slide14.xml><?xml version="1.0" encoding="utf-8"?>
+<p:sld xmlns:a="http://schemas.openxmlformats.org/drawingml/2006/main" xmlns:r="http://schemas.openxmlformats.org/officeDocument/2006/relationships" xmlns:p="http://schemas.openxmlformats.org/presentationml/2006/main">
+  <p:cSld>
+    <p:bg>
+      <p:bgPr>
+        <a:gradFill>
+          <a:gsLst>
+            <a:gs pos="0">
+              <a:srgbClr val="990033">
+                <a:lumMod val="81000"/>
+              </a:srgbClr>
+            </a:gs>
+            <a:gs pos="84000">
+              <a:schemeClr val="accent4">
+                <a:lumMod val="25000"/>
+              </a:schemeClr>
+            </a:gs>
+          </a:gsLst>
+          <a:lin ang="19200000" scaled="0"/>
+        </a:gradFill>
+        <a:effectLst/>
+      </p:bgPr>
+    </p:bg>
+    <p:spTree>
+      <p:nvGrpSpPr>
+        <p:cNvPr id="1" name=""/>
+        <p:cNvGrpSpPr/>
+        <p:nvPr/>
+      </p:nvGrpSpPr>
+      <p:grpSpPr>
+        <a:xfrm>
+          <a:off x="0" y="0"/>
+          <a:ext cx="0" cy="0"/>
+          <a:chOff x="0" y="0"/>
+          <a:chExt cx="0" cy="0"/>
+        </a:xfrm>
+      </p:grpSpPr>
+      <p:sp>
+        <p:nvSpPr>
+          <p:cNvPr id="2" name="1 CuadroTexto"/>
+          <p:cNvSpPr txBox="1"/>
+          <p:nvPr/>
+        </p:nvSpPr>
+        <p:spPr>
+          <a:xfrm>
+            <a:off x="539552" y="565229"/>
+            <a:ext cx="3384376" cy="830997"/>
+          </a:xfrm>
+          <a:prstGeom prst="rect">
+            <a:avLst/>
+          </a:prstGeom>
+          <a:noFill/>
+        </p:spPr>
+        <p:txBody>
+          <a:bodyPr wrap="square" rtlCol="0">
+            <a:spAutoFit/>
+          </a:bodyPr>
+          <a:lstStyle/>
+          <a:p>
+            <a:pPr algn="ctr"/>
+            <a:r>
+              <a:rPr lang="es-MX" sz="4800" dirty="0" smtClean="0">
+                <a:solidFill>
+                  <a:schemeClr val="bg1"/>
+                </a:solidFill>
+                <a:latin typeface="Futurama" pitchFamily="2" charset="0"/>
+              </a:rPr>
+              <a:t>Google</a:t>
+            </a:r>
+            <a:endParaRPr lang="es-VE" sz="4800" dirty="0">
+              <a:solidFill>
+                <a:schemeClr val="bg1"/>
+              </a:solidFill>
+              <a:latin typeface="Futurama" pitchFamily="2" charset="0"/>
+            </a:endParaRPr>
+          </a:p>
+        </p:txBody>
+      </p:sp>
+      <p:pic>
+        <p:nvPicPr>
+          <p:cNvPr id="3074" name="Picture 2" descr="C:\Users\Leonardo\Downloads\pngwing.com.png"/>
+          <p:cNvPicPr>
+            <a:picLocks noChangeAspect="1" noChangeArrowheads="1"/>
+          </p:cNvPicPr>
+          <p:nvPr/>
+        </p:nvPicPr>
+        <p:blipFill>
+          <a:blip r:embed="rId2" cstate="print">
+            <a:extLst>
+              <a:ext uri="{28A0092B-C50C-407E-A947-70E740481C1C}">
+                <a14:useLocalDpi xmlns:a14="http://schemas.microsoft.com/office/drawing/2010/main" val="0"/>
+              </a:ext>
+            </a:extLst>
+          </a:blip>
+          <a:srcRect/>
+          <a:stretch>
+            <a:fillRect/>
+          </a:stretch>
+        </p:blipFill>
+        <p:spPr bwMode="auto">
+          <a:xfrm>
+            <a:off x="5652120" y="234819"/>
+            <a:ext cx="2417624" cy="2420576"/>
+          </a:xfrm>
+          <a:prstGeom prst="rect">
+            <a:avLst/>
+          </a:prstGeom>
+          <a:noFill/>
+          <a:extLst>
+            <a:ext uri="{909E8E84-426E-40DD-AFC4-6F175D3DCCD1}">
+              <a14:hiddenFill xmlns:a14="http://schemas.microsoft.com/office/drawing/2010/main">
+                <a:solidFill>
+                  <a:srgbClr val="FFFFFF"/>
+                </a:solidFill>
+              </a14:hiddenFill>
+            </a:ext>
+          </a:extLst>
+        </p:spPr>
+      </p:pic>
+      <p:pic>
+        <p:nvPicPr>
+          <p:cNvPr id="3075" name="Picture 3" descr="C:\Users\Leonardo\Downloads\pngwing.com (1).png"/>
+          <p:cNvPicPr>
+            <a:picLocks noChangeAspect="1" noChangeArrowheads="1"/>
+          </p:cNvPicPr>
+          <p:nvPr/>
+        </p:nvPicPr>
+        <p:blipFill>
+          <a:blip r:embed="rId3" cstate="print">
+            <a:extLst>
+              <a:ext uri="{28A0092B-C50C-407E-A947-70E740481C1C}">
+                <a14:useLocalDpi xmlns:a14="http://schemas.microsoft.com/office/drawing/2010/main" val="0"/>
+              </a:ext>
+            </a:extLst>
+          </a:blip>
+          <a:srcRect/>
+          <a:stretch>
+            <a:fillRect/>
+          </a:stretch>
+        </p:blipFill>
+        <p:spPr bwMode="auto">
+          <a:xfrm flipH="1">
+            <a:off x="3189101" y="999963"/>
+            <a:ext cx="1469654" cy="1469654"/>
+          </a:xfrm>
+          <a:prstGeom prst="rect">
+            <a:avLst/>
+          </a:prstGeom>
+          <a:noFill/>
+          <a:extLst>
+            <a:ext uri="{909E8E84-426E-40DD-AFC4-6F175D3DCCD1}">
+              <a14:hiddenFill xmlns:a14="http://schemas.microsoft.com/office/drawing/2010/main">
+                <a:solidFill>
+                  <a:srgbClr val="FFFFFF"/>
+                </a:solidFill>
+              </a14:hiddenFill>
+            </a:ext>
+          </a:extLst>
+        </p:spPr>
+      </p:pic>
+      <p:pic>
+        <p:nvPicPr>
+          <p:cNvPr id="3076" name="Picture 4"/>
+          <p:cNvPicPr>
+            <a:picLocks noChangeAspect="1" noChangeArrowheads="1"/>
+          </p:cNvPicPr>
+          <p:nvPr/>
+        </p:nvPicPr>
+        <p:blipFill>
+          <a:blip r:embed="rId4">
+            <a:extLst>
+              <a:ext uri="{28A0092B-C50C-407E-A947-70E740481C1C}">
+                <a14:useLocalDpi xmlns:a14="http://schemas.microsoft.com/office/drawing/2010/main" val="0"/>
+              </a:ext>
+            </a:extLst>
+          </a:blip>
+          <a:srcRect/>
+          <a:stretch>
+            <a:fillRect/>
+          </a:stretch>
+        </p:blipFill>
+        <p:spPr bwMode="auto">
+          <a:xfrm>
+            <a:off x="778975" y="2780928"/>
+            <a:ext cx="7759560" cy="3838317"/>
+          </a:xfrm>
+          <a:prstGeom prst="rect">
+            <a:avLst/>
+          </a:prstGeom>
+          <a:noFill/>
+          <a:ln>
+            <a:noFill/>
+          </a:ln>
+          <a:extLst>
+            <a:ext uri="{909E8E84-426E-40DD-AFC4-6F175D3DCCD1}">
+              <a14:hiddenFill xmlns:a14="http://schemas.microsoft.com/office/drawing/2010/main">
+                <a:solidFill>
+                  <a:schemeClr val="accent1"/>
+                </a:solidFill>
+              </a14:hiddenFill>
+            </a:ext>
+            <a:ext uri="{91240B29-F687-4F45-9708-019B960494DF}">
+              <a14:hiddenLine xmlns:a14="http://schemas.microsoft.com/office/drawing/2010/main" w="9525">
+                <a:solidFill>
+                  <a:schemeClr val="tx1"/>
+                </a:solidFill>
+                <a:miter lim="800000"/>
+                <a:headEnd/>
+                <a:tailEnd/>
+              </a14:hiddenLine>
+            </a:ext>
+          </a:extLst>
+        </p:spPr>
+      </p:pic>
+    </p:spTree>
+    <p:extLst>
+      <p:ext uri="{BB962C8B-B14F-4D97-AF65-F5344CB8AC3E}">
+        <p14:creationId xmlns:p14="http://schemas.microsoft.com/office/powerpoint/2010/main" val="2410921887"/>
+      </p:ext>
+    </p:extLst>
+  </p:cSld>
+  <p:clrMapOvr>
+    <a:masterClrMapping/>
+  </p:clrMapOvr>
+  <p:timing>
+    <p:tnLst>
+      <p:par>
+        <p:cTn id="1" dur="indefinite" restart="never" nodeType="tmRoot"/>
+      </p:par>
+    </p:tnLst>
+  </p:timing>
+</p:sld>
+</file>
+
+<file path=ppt/slides/slide15.xml><?xml version="1.0" encoding="utf-8"?>
+<p:sld xmlns:a="http://schemas.openxmlformats.org/drawingml/2006/main" xmlns:r="http://schemas.openxmlformats.org/officeDocument/2006/relationships" xmlns:p="http://schemas.openxmlformats.org/presentationml/2006/main">
+  <p:cSld>
+    <p:bg>
+      <p:bgPr>
+        <a:gradFill>
+          <a:gsLst>
+            <a:gs pos="0">
+              <a:srgbClr val="990033">
+                <a:lumMod val="81000"/>
+              </a:srgbClr>
+            </a:gs>
+            <a:gs pos="84000">
+              <a:schemeClr val="accent4">
+                <a:lumMod val="25000"/>
+              </a:schemeClr>
+            </a:gs>
+          </a:gsLst>
+          <a:lin ang="19200000" scaled="0"/>
+        </a:gradFill>
+        <a:effectLst/>
+      </p:bgPr>
+    </p:bg>
+    <p:spTree>
+      <p:nvGrpSpPr>
+        <p:cNvPr id="1" name=""/>
+        <p:cNvGrpSpPr/>
+        <p:nvPr/>
+      </p:nvGrpSpPr>
+      <p:grpSpPr>
+        <a:xfrm>
+          <a:off x="0" y="0"/>
+          <a:ext cx="0" cy="0"/>
+          <a:chOff x="0" y="0"/>
+          <a:chExt cx="0" cy="0"/>
+        </a:xfrm>
+      </p:grpSpPr>
+      <p:sp>
+        <p:nvSpPr>
+          <p:cNvPr id="2" name="1 CuadroTexto"/>
+          <p:cNvSpPr txBox="1"/>
+          <p:nvPr/>
+        </p:nvSpPr>
+        <p:spPr>
+          <a:xfrm>
+            <a:off x="1403648" y="476672"/>
+            <a:ext cx="6559381" cy="1446550"/>
+          </a:xfrm>
+          <a:prstGeom prst="rect">
+            <a:avLst/>
+          </a:prstGeom>
+          <a:noFill/>
+        </p:spPr>
+        <p:txBody>
+          <a:bodyPr wrap="square" rtlCol="0">
+            <a:spAutoFit/>
+          </a:bodyPr>
+          <a:lstStyle/>
+          <a:p>
+            <a:pPr algn="ctr"/>
+            <a:r>
+              <a:rPr lang="es-MX" sz="8800" dirty="0" err="1" smtClean="0">
+                <a:solidFill>
+                  <a:schemeClr val="bg1"/>
+                </a:solidFill>
+                <a:latin typeface="Futurama" pitchFamily="2" charset="0"/>
+              </a:rPr>
+              <a:t>GitHub</a:t>
+            </a:r>
+            <a:r>
+              <a:rPr lang="es-MX" sz="8800" dirty="0" smtClean="0">
+                <a:solidFill>
+                  <a:schemeClr val="bg1"/>
+                </a:solidFill>
+                <a:latin typeface="Futurama" pitchFamily="2" charset="0"/>
+              </a:rPr>
+              <a:t> vs </a:t>
+            </a:r>
+            <a:r>
+              <a:rPr lang="es-MX" sz="8800" dirty="0" err="1" smtClean="0">
+                <a:solidFill>
+                  <a:schemeClr val="bg1"/>
+                </a:solidFill>
+                <a:latin typeface="Futurama" pitchFamily="2" charset="0"/>
+              </a:rPr>
+              <a:t>GitLab</a:t>
+            </a:r>
+            <a:endParaRPr lang="es-VE" sz="8800" dirty="0">
+              <a:solidFill>
+                <a:schemeClr val="bg1"/>
+              </a:solidFill>
+              <a:latin typeface="Futurama" pitchFamily="2" charset="0"/>
+            </a:endParaRPr>
+          </a:p>
+        </p:txBody>
+      </p:sp>
+      <p:pic>
+        <p:nvPicPr>
+          <p:cNvPr id="4098" name="Picture 2" descr="C:\Users\Leonardo\Downloads\pngwing.com (3).png"/>
+          <p:cNvPicPr>
+            <a:picLocks noChangeAspect="1" noChangeArrowheads="1"/>
+          </p:cNvPicPr>
+          <p:nvPr/>
+        </p:nvPicPr>
+        <p:blipFill>
+          <a:blip r:embed="rId2" cstate="print">
+            <a:extLst>
+              <a:ext uri="{28A0092B-C50C-407E-A947-70E740481C1C}">
+                <a14:useLocalDpi xmlns:a14="http://schemas.microsoft.com/office/drawing/2010/main" val="0"/>
+              </a:ext>
+            </a:extLst>
+          </a:blip>
+          <a:srcRect/>
+          <a:stretch>
+            <a:fillRect/>
+          </a:stretch>
+        </p:blipFill>
+        <p:spPr bwMode="auto">
+          <a:xfrm>
+            <a:off x="4721567" y="2279526"/>
+            <a:ext cx="3450833" cy="3450833"/>
+          </a:xfrm>
+          <a:prstGeom prst="rect">
+            <a:avLst/>
+          </a:prstGeom>
+          <a:noFill/>
+          <a:extLst>
+            <a:ext uri="{909E8E84-426E-40DD-AFC4-6F175D3DCCD1}">
+              <a14:hiddenFill xmlns:a14="http://schemas.microsoft.com/office/drawing/2010/main">
+                <a:solidFill>
+                  <a:srgbClr val="FFFFFF"/>
+                </a:solidFill>
+              </a14:hiddenFill>
+            </a:ext>
+          </a:extLst>
+        </p:spPr>
+      </p:pic>
+      <p:pic>
+        <p:nvPicPr>
+          <p:cNvPr id="4099" name="Picture 3" descr="C:\Users\Leonardo\Downloads\pngwing.com (2).png"/>
+          <p:cNvPicPr>
+            <a:picLocks noChangeAspect="1" noChangeArrowheads="1"/>
+          </p:cNvPicPr>
+          <p:nvPr/>
+        </p:nvPicPr>
+        <p:blipFill>
+          <a:blip r:embed="rId3" cstate="print">
+            <a:extLst>
+              <a:ext uri="{28A0092B-C50C-407E-A947-70E740481C1C}">
+                <a14:useLocalDpi xmlns:a14="http://schemas.microsoft.com/office/drawing/2010/main" val="0"/>
+              </a:ext>
+            </a:extLst>
+          </a:blip>
+          <a:srcRect/>
+          <a:stretch>
+            <a:fillRect/>
+          </a:stretch>
+        </p:blipFill>
+        <p:spPr bwMode="auto">
+          <a:xfrm>
+            <a:off x="1305099" y="2520360"/>
+            <a:ext cx="2990602" cy="2916028"/>
+          </a:xfrm>
+          <a:prstGeom prst="rect">
+            <a:avLst/>
+          </a:prstGeom>
+          <a:noFill/>
+          <a:extLst>
+            <a:ext uri="{909E8E84-426E-40DD-AFC4-6F175D3DCCD1}">
+              <a14:hiddenFill xmlns:a14="http://schemas.microsoft.com/office/drawing/2010/main">
+                <a:solidFill>
+                  <a:srgbClr val="FFFFFF"/>
+                </a:solidFill>
+              </a14:hiddenFill>
+            </a:ext>
+          </a:extLst>
+        </p:spPr>
+      </p:pic>
+    </p:spTree>
+    <p:extLst>
+      <p:ext uri="{BB962C8B-B14F-4D97-AF65-F5344CB8AC3E}">
+        <p14:creationId xmlns:p14="http://schemas.microsoft.com/office/powerpoint/2010/main" val="4245539046"/>
       </p:ext>
     </p:extLst>
   </p:cSld>

</xml_diff>